<commit_message>
== A star Update ==
</commit_message>
<xml_diff>
--- a/CrazyArcade/기획.pptx
+++ b/CrazyArcade/기획.pptx
@@ -1,6 +1,6 @@
 
 <file path=ppt/presentation.xml><?xml version="1.0" encoding="utf-8"?>
-<p:presentation xmlns:a="http://schemas.openxmlformats.org/drawingml/2006/main" xmlns:r="http://schemas.openxmlformats.org/officeDocument/2006/relationships" xmlns:p="http://schemas.openxmlformats.org/presentationml/2006/main" saveSubsetFonts="1">
+<p:presentation xmlns:a="http://schemas.openxmlformats.org/drawingml/2006/main" xmlns:r="http://schemas.openxmlformats.org/officeDocument/2006/relationships" xmlns:p="http://schemas.openxmlformats.org/presentationml/2006/main" embedTrueTypeFonts="1" saveSubsetFonts="1">
   <p:sldMasterIdLst>
     <p:sldMasterId id="2147483660" r:id="rId1"/>
   </p:sldMasterIdLst>
@@ -16,6 +16,33 @@
   </p:sldIdLst>
   <p:sldSz cx="9144000" cy="6858000" type="screen4x3"/>
   <p:notesSz cx="6858000" cy="9144000"/>
+  <p:embeddedFontLst>
+    <p:embeddedFont>
+      <p:font typeface="Calibri" panose="020F0502020204030204" pitchFamily="34" charset="0"/>
+      <p:regular r:id="rId10"/>
+      <p:bold r:id="rId11"/>
+      <p:italic r:id="rId12"/>
+      <p:boldItalic r:id="rId13"/>
+    </p:embeddedFont>
+    <p:embeddedFont>
+      <p:font typeface="맑은 고딕" panose="020B0503020000020004" pitchFamily="50" charset="-127"/>
+      <p:regular r:id="rId14"/>
+      <p:bold r:id="rId15"/>
+    </p:embeddedFont>
+    <p:embeddedFont>
+      <p:font typeface="Cooper Black" panose="0208090404030B020404" pitchFamily="18" charset="0"/>
+      <p:regular r:id="rId16"/>
+    </p:embeddedFont>
+    <p:embeddedFont>
+      <p:font typeface="Black Han Sans" pitchFamily="2" charset="-127"/>
+      <p:regular r:id="rId17"/>
+    </p:embeddedFont>
+    <p:embeddedFont>
+      <p:font typeface="Calibri Light" panose="020F0302020204030204" pitchFamily="34" charset="0"/>
+      <p:regular r:id="rId18"/>
+      <p:italic r:id="rId19"/>
+    </p:embeddedFont>
+  </p:embeddedFontLst>
   <p:defaultTextStyle>
     <a:defPPr>
       <a:defRPr lang="ko-KR"/>
@@ -111,6 +138,11 @@
       </a:defRPr>
     </a:lvl9pPr>
   </p:defaultTextStyle>
+  <p:extLst>
+    <p:ext uri="{EFAFB233-063F-42B5-8137-9DF3F51BA10A}">
+      <p15:sldGuideLst xmlns:p15="http://schemas.microsoft.com/office/powerpoint/2012/main"/>
+    </p:ext>
+  </p:extLst>
 </p:presentation>
 </file>
 
@@ -245,7 +277,7 @@
           <a:p>
             <a:fld id="{009C521D-D4F7-40E9-8865-190C6A106496}" type="datetimeFigureOut">
               <a:rPr lang="ko-KR" altLang="en-US" smtClean="0"/>
-              <a:t>2020-08-18</a:t>
+              <a:t>2020-08-19</a:t>
             </a:fld>
             <a:endParaRPr lang="ko-KR" altLang="en-US"/>
           </a:p>
@@ -415,7 +447,7 @@
           <a:p>
             <a:fld id="{009C521D-D4F7-40E9-8865-190C6A106496}" type="datetimeFigureOut">
               <a:rPr lang="ko-KR" altLang="en-US" smtClean="0"/>
-              <a:t>2020-08-18</a:t>
+              <a:t>2020-08-19</a:t>
             </a:fld>
             <a:endParaRPr lang="ko-KR" altLang="en-US"/>
           </a:p>
@@ -595,7 +627,7 @@
           <a:p>
             <a:fld id="{009C521D-D4F7-40E9-8865-190C6A106496}" type="datetimeFigureOut">
               <a:rPr lang="ko-KR" altLang="en-US" smtClean="0"/>
-              <a:t>2020-08-18</a:t>
+              <a:t>2020-08-19</a:t>
             </a:fld>
             <a:endParaRPr lang="ko-KR" altLang="en-US"/>
           </a:p>
@@ -765,7 +797,7 @@
           <a:p>
             <a:fld id="{009C521D-D4F7-40E9-8865-190C6A106496}" type="datetimeFigureOut">
               <a:rPr lang="ko-KR" altLang="en-US" smtClean="0"/>
-              <a:t>2020-08-18</a:t>
+              <a:t>2020-08-19</a:t>
             </a:fld>
             <a:endParaRPr lang="ko-KR" altLang="en-US"/>
           </a:p>
@@ -1009,7 +1041,7 @@
           <a:p>
             <a:fld id="{009C521D-D4F7-40E9-8865-190C6A106496}" type="datetimeFigureOut">
               <a:rPr lang="ko-KR" altLang="en-US" smtClean="0"/>
-              <a:t>2020-08-18</a:t>
+              <a:t>2020-08-19</a:t>
             </a:fld>
             <a:endParaRPr lang="ko-KR" altLang="en-US"/>
           </a:p>
@@ -1241,7 +1273,7 @@
           <a:p>
             <a:fld id="{009C521D-D4F7-40E9-8865-190C6A106496}" type="datetimeFigureOut">
               <a:rPr lang="ko-KR" altLang="en-US" smtClean="0"/>
-              <a:t>2020-08-18</a:t>
+              <a:t>2020-08-19</a:t>
             </a:fld>
             <a:endParaRPr lang="ko-KR" altLang="en-US"/>
           </a:p>
@@ -1608,7 +1640,7 @@
           <a:p>
             <a:fld id="{009C521D-D4F7-40E9-8865-190C6A106496}" type="datetimeFigureOut">
               <a:rPr lang="ko-KR" altLang="en-US" smtClean="0"/>
-              <a:t>2020-08-18</a:t>
+              <a:t>2020-08-19</a:t>
             </a:fld>
             <a:endParaRPr lang="ko-KR" altLang="en-US"/>
           </a:p>
@@ -1726,7 +1758,7 @@
           <a:p>
             <a:fld id="{009C521D-D4F7-40E9-8865-190C6A106496}" type="datetimeFigureOut">
               <a:rPr lang="ko-KR" altLang="en-US" smtClean="0"/>
-              <a:t>2020-08-18</a:t>
+              <a:t>2020-08-19</a:t>
             </a:fld>
             <a:endParaRPr lang="ko-KR" altLang="en-US"/>
           </a:p>
@@ -1821,7 +1853,7 @@
           <a:p>
             <a:fld id="{009C521D-D4F7-40E9-8865-190C6A106496}" type="datetimeFigureOut">
               <a:rPr lang="ko-KR" altLang="en-US" smtClean="0"/>
-              <a:t>2020-08-18</a:t>
+              <a:t>2020-08-19</a:t>
             </a:fld>
             <a:endParaRPr lang="ko-KR" altLang="en-US"/>
           </a:p>
@@ -2098,7 +2130,7 @@
           <a:p>
             <a:fld id="{009C521D-D4F7-40E9-8865-190C6A106496}" type="datetimeFigureOut">
               <a:rPr lang="ko-KR" altLang="en-US" smtClean="0"/>
-              <a:t>2020-08-18</a:t>
+              <a:t>2020-08-19</a:t>
             </a:fld>
             <a:endParaRPr lang="ko-KR" altLang="en-US"/>
           </a:p>
@@ -2355,7 +2387,7 @@
           <a:p>
             <a:fld id="{009C521D-D4F7-40E9-8865-190C6A106496}" type="datetimeFigureOut">
               <a:rPr lang="ko-KR" altLang="en-US" smtClean="0"/>
-              <a:t>2020-08-18</a:t>
+              <a:t>2020-08-19</a:t>
             </a:fld>
             <a:endParaRPr lang="ko-KR" altLang="en-US"/>
           </a:p>
@@ -2568,7 +2600,7 @@
           <a:p>
             <a:fld id="{009C521D-D4F7-40E9-8865-190C6A106496}" type="datetimeFigureOut">
               <a:rPr lang="ko-KR" altLang="en-US" smtClean="0"/>
-              <a:t>2020-08-18</a:t>
+              <a:t>2020-08-19</a:t>
             </a:fld>
             <a:endParaRPr lang="ko-KR" altLang="en-US"/>
           </a:p>
@@ -3171,12 +3203,14 @@
             <a:pPr algn="r"/>
             <a:r>
               <a:rPr lang="en-US" altLang="ko-KR" sz="2400" dirty="0" smtClean="0">
-                <a:latin typeface="Anton" panose="00000500000000000000" pitchFamily="2" charset="0"/>
+                <a:latin typeface="DX방탄고딕 Std" panose="02020600000000000000" pitchFamily="18" charset="-127"/>
+                <a:ea typeface="DX방탄고딕 Std" panose="02020600000000000000" pitchFamily="18" charset="-127"/>
               </a:rPr>
               <a:t>20.08.19</a:t>
             </a:r>
             <a:endParaRPr lang="ko-KR" altLang="en-US" sz="2400" dirty="0">
-              <a:latin typeface="Anton" panose="00000500000000000000" pitchFamily="2" charset="0"/>
+              <a:latin typeface="DX방탄고딕 Std" panose="02020600000000000000" pitchFamily="18" charset="-127"/>
+              <a:ea typeface="DX방탄고딕 Std" panose="02020600000000000000" pitchFamily="18" charset="-127"/>
             </a:endParaRPr>
           </a:p>
         </p:txBody>
@@ -4768,8 +4802,8 @@
         </p:nvSpPr>
         <p:spPr>
           <a:xfrm>
-            <a:off x="205740" y="219890"/>
-            <a:ext cx="3002280" cy="707886"/>
+            <a:off x="205739" y="219890"/>
+            <a:ext cx="3235729" cy="707886"/>
           </a:xfrm>
           <a:prstGeom prst="rect">
             <a:avLst/>
@@ -4806,8 +4840,8 @@
                 <a:solidFill>
                   <a:schemeClr val="bg1"/>
                 </a:solidFill>
-                <a:latin typeface="Anton" panose="00000500000000000000" pitchFamily="2" charset="0"/>
-                <a:ea typeface="Black Han Sans" pitchFamily="2" charset="-127"/>
+                <a:latin typeface="DX방탄고딕 Std" panose="02020600000000000000" pitchFamily="18" charset="-127"/>
+                <a:ea typeface="DX방탄고딕 Std" panose="02020600000000000000" pitchFamily="18" charset="-127"/>
               </a:rPr>
               <a:t>1 </a:t>
             </a:r>
@@ -6021,7 +6055,7 @@
         <p:spPr>
           <a:xfrm>
             <a:off x="205740" y="219890"/>
-            <a:ext cx="3002280" cy="707886"/>
+            <a:ext cx="3261360" cy="707886"/>
           </a:xfrm>
           <a:prstGeom prst="rect">
             <a:avLst/>
@@ -6058,8 +6092,8 @@
                 <a:solidFill>
                   <a:schemeClr val="bg1"/>
                 </a:solidFill>
-                <a:latin typeface="Anton" panose="00000500000000000000" pitchFamily="2" charset="0"/>
-                <a:ea typeface="Black Han Sans" pitchFamily="2" charset="-127"/>
+                <a:latin typeface="DX방탄고딕 Std" panose="02020600000000000000" pitchFamily="18" charset="-127"/>
+                <a:ea typeface="DX방탄고딕 Std" panose="02020600000000000000" pitchFamily="18" charset="-127"/>
               </a:rPr>
               <a:t>2</a:t>
             </a:r>
@@ -7243,7 +7277,7 @@
         <p:spPr>
           <a:xfrm>
             <a:off x="205740" y="219890"/>
-            <a:ext cx="3002280" cy="707886"/>
+            <a:ext cx="3310544" cy="707886"/>
           </a:xfrm>
           <a:prstGeom prst="rect">
             <a:avLst/>
@@ -7280,10 +7314,20 @@
                 <a:solidFill>
                   <a:schemeClr val="bg1"/>
                 </a:solidFill>
+                <a:latin typeface="DX방탄고딕 Std" panose="02020600000000000000" pitchFamily="18" charset="-127"/>
+                <a:ea typeface="DX방탄고딕 Std" panose="02020600000000000000" pitchFamily="18" charset="-127"/>
+              </a:rPr>
+              <a:t>3</a:t>
+            </a:r>
+            <a:r>
+              <a:rPr lang="en-US" altLang="ko-KR" sz="4000" dirty="0" smtClean="0">
+                <a:solidFill>
+                  <a:schemeClr val="bg1"/>
+                </a:solidFill>
                 <a:latin typeface="Anton" panose="00000500000000000000" pitchFamily="2" charset="0"/>
                 <a:ea typeface="Black Han Sans" pitchFamily="2" charset="-127"/>
               </a:rPr>
-              <a:t>3 </a:t>
+              <a:t> </a:t>
             </a:r>
             <a:r>
               <a:rPr lang="ko-KR" altLang="en-US" sz="4000" dirty="0" smtClean="0">
@@ -8487,8 +8531,8 @@
         </p:nvSpPr>
         <p:spPr>
           <a:xfrm>
-            <a:off x="5715000" y="2857500"/>
-            <a:ext cx="3268980" cy="2215991"/>
+            <a:off x="5509260" y="3149411"/>
+            <a:ext cx="3268980" cy="1446550"/>
           </a:xfrm>
           <a:prstGeom prst="rect">
             <a:avLst/>
@@ -8502,19 +8546,21 @@
           <a:lstStyle/>
           <a:p>
             <a:r>
-              <a:rPr lang="en-US" altLang="ko-KR" sz="13800" dirty="0" smtClean="0">
+              <a:rPr lang="en-US" altLang="ko-KR" sz="8800" dirty="0" smtClean="0">
                 <a:solidFill>
                   <a:schemeClr val="bg1"/>
                 </a:solidFill>
-                <a:latin typeface="Anton" panose="00000500000000000000" pitchFamily="2" charset="0"/>
+                <a:latin typeface="DX방탄고딕 Std" panose="02020600000000000000" pitchFamily="18" charset="-127"/>
+                <a:ea typeface="DX방탄고딕 Std" panose="02020600000000000000" pitchFamily="18" charset="-127"/>
               </a:rPr>
               <a:t>Q&amp;A</a:t>
             </a:r>
-            <a:endParaRPr lang="ko-KR" altLang="en-US" sz="13800" dirty="0">
+            <a:endParaRPr lang="ko-KR" altLang="en-US" sz="8800" dirty="0">
               <a:solidFill>
                 <a:schemeClr val="bg1"/>
               </a:solidFill>
-              <a:latin typeface="Anton" panose="00000500000000000000" pitchFamily="2" charset="0"/>
+              <a:latin typeface="DX방탄고딕 Std" panose="02020600000000000000" pitchFamily="18" charset="-127"/>
+              <a:ea typeface="DX방탄고딕 Std" panose="02020600000000000000" pitchFamily="18" charset="-127"/>
             </a:endParaRPr>
           </a:p>
         </p:txBody>

</xml_diff>